<commit_message>
Merged methods, results, and conclusions
</commit_message>
<xml_diff>
--- a/poster/Breakdown.pptx
+++ b/poster/Breakdown.pptx
@@ -12,6 +12,7 @@
     <p:sldId id="264" r:id="rId6"/>
     <p:sldId id="265" r:id="rId7"/>
     <p:sldId id="266" r:id="rId8"/>
+    <p:sldId id="267" r:id="rId9"/>
   </p:sldIdLst>
   <p:sldSz cx="9144000" cy="6858000" type="screen4x3"/>
   <p:notesSz cx="6858000" cy="9144000"/>
@@ -474,11 +475,11 @@
           <c:showPercent val="0"/>
           <c:showBubbleSize val="0"/>
         </c:dLbls>
-        <c:axId val="93592576"/>
-        <c:axId val="98760576"/>
+        <c:axId val="73345664"/>
+        <c:axId val="74105600"/>
       </c:scatterChart>
       <c:valAx>
-        <c:axId val="93592576"/>
+        <c:axId val="73345664"/>
         <c:scaling>
           <c:orientation val="minMax"/>
           <c:max val="40453"/>
@@ -523,14 +524,14 @@
         <c:majorTickMark val="none"/>
         <c:minorTickMark val="none"/>
         <c:tickLblPos val="nextTo"/>
-        <c:crossAx val="98760576"/>
+        <c:crossAx val="74105600"/>
         <c:crosses val="autoZero"/>
         <c:crossBetween val="midCat"/>
         <c:majorUnit val="0.25"/>
         <c:minorUnit val="8.3333333330000009E-2"/>
       </c:valAx>
       <c:valAx>
-        <c:axId val="98760576"/>
+        <c:axId val="74105600"/>
         <c:scaling>
           <c:orientation val="minMax"/>
         </c:scaling>
@@ -568,7 +569,7 @@
         <c:majorTickMark val="none"/>
         <c:minorTickMark val="none"/>
         <c:tickLblPos val="nextTo"/>
-        <c:crossAx val="93592576"/>
+        <c:crossAx val="73345664"/>
         <c:crosses val="autoZero"/>
         <c:crossBetween val="midCat"/>
       </c:valAx>
@@ -772,7 +773,7 @@
           <a:p>
             <a:fld id="{4ECC5B62-F377-4AE5-8F26-CB3E943C5A84}" type="datetimeFigureOut">
               <a:rPr lang="en-US" smtClean="0"/>
-              <a:t>12/2/2013</a:t>
+              <a:t>12/9/2013</a:t>
             </a:fld>
             <a:endParaRPr lang="en-US"/>
           </a:p>
@@ -942,7 +943,7 @@
           <a:p>
             <a:fld id="{4ECC5B62-F377-4AE5-8F26-CB3E943C5A84}" type="datetimeFigureOut">
               <a:rPr lang="en-US" smtClean="0"/>
-              <a:t>12/2/2013</a:t>
+              <a:t>12/9/2013</a:t>
             </a:fld>
             <a:endParaRPr lang="en-US"/>
           </a:p>
@@ -1122,7 +1123,7 @@
           <a:p>
             <a:fld id="{4ECC5B62-F377-4AE5-8F26-CB3E943C5A84}" type="datetimeFigureOut">
               <a:rPr lang="en-US" smtClean="0"/>
-              <a:t>12/2/2013</a:t>
+              <a:t>12/9/2013</a:t>
             </a:fld>
             <a:endParaRPr lang="en-US"/>
           </a:p>
@@ -1292,7 +1293,7 @@
           <a:p>
             <a:fld id="{4ECC5B62-F377-4AE5-8F26-CB3E943C5A84}" type="datetimeFigureOut">
               <a:rPr lang="en-US" smtClean="0"/>
-              <a:t>12/2/2013</a:t>
+              <a:t>12/9/2013</a:t>
             </a:fld>
             <a:endParaRPr lang="en-US"/>
           </a:p>
@@ -1538,7 +1539,7 @@
           <a:p>
             <a:fld id="{4ECC5B62-F377-4AE5-8F26-CB3E943C5A84}" type="datetimeFigureOut">
               <a:rPr lang="en-US" smtClean="0"/>
-              <a:t>12/2/2013</a:t>
+              <a:t>12/9/2013</a:t>
             </a:fld>
             <a:endParaRPr lang="en-US"/>
           </a:p>
@@ -1826,7 +1827,7 @@
           <a:p>
             <a:fld id="{4ECC5B62-F377-4AE5-8F26-CB3E943C5A84}" type="datetimeFigureOut">
               <a:rPr lang="en-US" smtClean="0"/>
-              <a:t>12/2/2013</a:t>
+              <a:t>12/9/2013</a:t>
             </a:fld>
             <a:endParaRPr lang="en-US"/>
           </a:p>
@@ -2248,7 +2249,7 @@
           <a:p>
             <a:fld id="{4ECC5B62-F377-4AE5-8F26-CB3E943C5A84}" type="datetimeFigureOut">
               <a:rPr lang="en-US" smtClean="0"/>
-              <a:t>12/2/2013</a:t>
+              <a:t>12/9/2013</a:t>
             </a:fld>
             <a:endParaRPr lang="en-US"/>
           </a:p>
@@ -2366,7 +2367,7 @@
           <a:p>
             <a:fld id="{4ECC5B62-F377-4AE5-8F26-CB3E943C5A84}" type="datetimeFigureOut">
               <a:rPr lang="en-US" smtClean="0"/>
-              <a:t>12/2/2013</a:t>
+              <a:t>12/9/2013</a:t>
             </a:fld>
             <a:endParaRPr lang="en-US"/>
           </a:p>
@@ -2461,7 +2462,7 @@
           <a:p>
             <a:fld id="{4ECC5B62-F377-4AE5-8F26-CB3E943C5A84}" type="datetimeFigureOut">
               <a:rPr lang="en-US" smtClean="0"/>
-              <a:t>12/2/2013</a:t>
+              <a:t>12/9/2013</a:t>
             </a:fld>
             <a:endParaRPr lang="en-US"/>
           </a:p>
@@ -2738,7 +2739,7 @@
           <a:p>
             <a:fld id="{4ECC5B62-F377-4AE5-8F26-CB3E943C5A84}" type="datetimeFigureOut">
               <a:rPr lang="en-US" smtClean="0"/>
-              <a:t>12/2/2013</a:t>
+              <a:t>12/9/2013</a:t>
             </a:fld>
             <a:endParaRPr lang="en-US"/>
           </a:p>
@@ -2991,7 +2992,7 @@
           <a:p>
             <a:fld id="{4ECC5B62-F377-4AE5-8F26-CB3E943C5A84}" type="datetimeFigureOut">
               <a:rPr lang="en-US" smtClean="0"/>
-              <a:t>12/2/2013</a:t>
+              <a:t>12/9/2013</a:t>
             </a:fld>
             <a:endParaRPr lang="en-US"/>
           </a:p>
@@ -3204,7 +3205,7 @@
           <a:p>
             <a:fld id="{4ECC5B62-F377-4AE5-8F26-CB3E943C5A84}" type="datetimeFigureOut">
               <a:rPr lang="en-US" smtClean="0"/>
-              <a:t>12/2/2013</a:t>
+              <a:t>12/9/2013</a:t>
             </a:fld>
             <a:endParaRPr lang="en-US"/>
           </a:p>
@@ -3699,11 +3700,7 @@
             </a:r>
             <a:r>
               <a:rPr lang="en-US" sz="2400" dirty="0" smtClean="0"/>
-              <a:t>estimated in </a:t>
-            </a:r>
-            <a:r>
-              <a:rPr lang="en-US" sz="2400" dirty="0" smtClean="0"/>
-              <a:t>most cases. Therefore, many researchers have turned their attention towards machine learning methods to create simplified models based on available </a:t>
+              <a:t>estimated in most cases. Therefore, many researchers have turned their attention towards machine learning methods to create simplified models based on available </a:t>
             </a:r>
             <a:r>
               <a:rPr lang="en-US" sz="2400" dirty="0"/>
@@ -3803,11 +3800,7 @@
             <a:pPr algn="just"/>
             <a:r>
               <a:rPr lang="en-US" sz="2400" dirty="0" smtClean="0"/>
-              <a:t>As opposed to measurements from weather stations, satellite observations offer total spatial coverage at the cost of reduced precision</a:t>
-            </a:r>
-            <a:r>
-              <a:rPr lang="en-US" sz="2400" dirty="0" smtClean="0"/>
-              <a:t>. Figure 1 shows samples from the North America Data Assimilation System (NLDAS) satellite-based observations available from the GES-DISC at NASA: values for the different meteorological variables are provided hourly for each cell within a regular grid.</a:t>
+              <a:t>As opposed to measurements from weather stations, satellite observations offer total spatial coverage at the cost of reduced precision. Figure 1 shows samples from the North America Data Assimilation System (NLDAS) satellite-based observations available from the GES-DISC at NASA: values for the different meteorological variables are provided hourly for each cell within a regular grid.</a:t>
             </a:r>
             <a:endParaRPr lang="en-US" sz="2400" dirty="0"/>
           </a:p>
@@ -4397,11 +4390,7 @@
             </a:r>
             <a:r>
               <a:rPr lang="en-US" sz="2400" dirty="0" smtClean="0"/>
-              <a:t>G</a:t>
-            </a:r>
-            <a:r>
-              <a:rPr lang="en-US" sz="2400" dirty="0" smtClean="0"/>
-              <a:t>ridded values for the weather variables are available every hour from NLDAS </a:t>
+              <a:t>Gridded values for the weather variables are available every hour from NLDAS </a:t>
             </a:r>
             <a:endParaRPr lang="en-US" sz="2400" dirty="0"/>
           </a:p>
@@ -4625,8 +4614,8 @@
           </a:p>
         </p:txBody>
       </p:sp>
-      <mc:AlternateContent xmlns:mc="http://schemas.openxmlformats.org/markup-compatibility/2006">
-        <mc:Choice xmlns:a14="http://schemas.microsoft.com/office/drawing/2010/main" Requires="a14">
+      <mc:AlternateContent xmlns:mc="http://schemas.openxmlformats.org/markup-compatibility/2006" xmlns:a14="http://schemas.microsoft.com/office/drawing/2010/main">
+        <mc:Choice Requires="a14">
           <p:sp>
             <p:nvSpPr>
               <p:cNvPr id="2" name="1 CuadroTexto"/>
@@ -4649,6 +4638,7 @@
               </a:bodyPr>
               <a:lstStyle/>
               <a:p>
+                <a:pPr/>
                 <a14:m>
                   <m:oMathPara xmlns:m="http://schemas.openxmlformats.org/officeDocument/2006/math">
                     <m:oMathParaPr>
@@ -4864,7 +4854,7 @@
             </p:txBody>
           </p:sp>
         </mc:Choice>
-        <mc:Fallback>
+        <mc:Fallback xmlns="">
           <p:sp>
             <p:nvSpPr>
               <p:cNvPr id="2" name="1 CuadroTexto"/>
@@ -4903,8 +4893,8 @@
           </p:sp>
         </mc:Fallback>
       </mc:AlternateContent>
-      <mc:AlternateContent xmlns:mc="http://schemas.openxmlformats.org/markup-compatibility/2006">
-        <mc:Choice xmlns:a14="http://schemas.microsoft.com/office/drawing/2010/main" Requires="a14">
+      <mc:AlternateContent xmlns:mc="http://schemas.openxmlformats.org/markup-compatibility/2006" xmlns:a14="http://schemas.microsoft.com/office/drawing/2010/main">
+        <mc:Choice Requires="a14">
           <p:sp>
             <p:nvSpPr>
               <p:cNvPr id="7" name="TextBox 3"/>
@@ -4994,7 +4984,7 @@
             </p:txBody>
           </p:sp>
         </mc:Choice>
-        <mc:Fallback>
+        <mc:Fallback xmlns="">
           <p:sp>
             <p:nvSpPr>
               <p:cNvPr id="7" name="TextBox 3"/>
@@ -7142,6 +7132,2007 @@
     <p:extLst>
       <p:ext uri="{BB962C8B-B14F-4D97-AF65-F5344CB8AC3E}">
         <p14:creationId xmlns:p14="http://schemas.microsoft.com/office/powerpoint/2010/main" val="282885580"/>
+      </p:ext>
+    </p:extLst>
+  </p:cSld>
+  <p:clrMapOvr>
+    <a:masterClrMapping/>
+  </p:clrMapOvr>
+</p:sld>
+</file>
+
+<file path=ppt/slides/slide8.xml><?xml version="1.0" encoding="utf-8"?>
+<p:sld xmlns:a="http://schemas.openxmlformats.org/drawingml/2006/main" xmlns:r="http://schemas.openxmlformats.org/officeDocument/2006/relationships" xmlns:p="http://schemas.openxmlformats.org/presentationml/2006/main">
+  <p:cSld>
+    <p:spTree>
+      <p:nvGrpSpPr>
+        <p:cNvPr id="1" name=""/>
+        <p:cNvGrpSpPr/>
+        <p:nvPr/>
+      </p:nvGrpSpPr>
+      <p:grpSpPr>
+        <a:xfrm>
+          <a:off x="0" y="0"/>
+          <a:ext cx="0" cy="0"/>
+          <a:chOff x="0" y="0"/>
+          <a:chExt cx="0" cy="0"/>
+        </a:xfrm>
+      </p:grpSpPr>
+      <p:sp>
+        <p:nvSpPr>
+          <p:cNvPr id="1028" name="1027 Rectángulo"/>
+          <p:cNvSpPr/>
+          <p:nvPr/>
+        </p:nvSpPr>
+        <p:spPr>
+          <a:xfrm>
+            <a:off x="1801900" y="1132592"/>
+            <a:ext cx="5349800" cy="792088"/>
+          </a:xfrm>
+          <a:prstGeom prst="rect">
+            <a:avLst/>
+          </a:prstGeom>
+          <a:solidFill>
+            <a:schemeClr val="accent2">
+              <a:lumMod val="60000"/>
+              <a:lumOff val="40000"/>
+              <a:alpha val="50000"/>
+            </a:schemeClr>
+          </a:solidFill>
+          <a:ln>
+            <a:solidFill>
+              <a:schemeClr val="accent2"/>
+            </a:solidFill>
+          </a:ln>
+        </p:spPr>
+        <p:style>
+          <a:lnRef idx="2">
+            <a:schemeClr val="accent1">
+              <a:shade val="50000"/>
+            </a:schemeClr>
+          </a:lnRef>
+          <a:fillRef idx="1">
+            <a:schemeClr val="accent1"/>
+          </a:fillRef>
+          <a:effectRef idx="0">
+            <a:schemeClr val="accent1"/>
+          </a:effectRef>
+          <a:fontRef idx="minor">
+            <a:schemeClr val="lt1"/>
+          </a:fontRef>
+        </p:style>
+        <p:txBody>
+          <a:bodyPr rtlCol="0" anchor="ctr"/>
+          <a:lstStyle/>
+          <a:p>
+            <a:pPr algn="ctr"/>
+            <a:endParaRPr lang="es-MX"/>
+          </a:p>
+        </p:txBody>
+      </p:sp>
+      <p:sp>
+        <p:nvSpPr>
+          <p:cNvPr id="5" name="4 Elipse"/>
+          <p:cNvSpPr/>
+          <p:nvPr/>
+        </p:nvSpPr>
+        <p:spPr>
+          <a:xfrm>
+            <a:off x="1895116" y="2259320"/>
+            <a:ext cx="504056" cy="504056"/>
+          </a:xfrm>
+          <a:prstGeom prst="ellipse">
+            <a:avLst/>
+          </a:prstGeom>
+        </p:spPr>
+        <p:style>
+          <a:lnRef idx="2">
+            <a:schemeClr val="accent1">
+              <a:shade val="50000"/>
+            </a:schemeClr>
+          </a:lnRef>
+          <a:fillRef idx="1">
+            <a:schemeClr val="accent1"/>
+          </a:fillRef>
+          <a:effectRef idx="0">
+            <a:schemeClr val="accent1"/>
+          </a:effectRef>
+          <a:fontRef idx="minor">
+            <a:schemeClr val="lt1"/>
+          </a:fontRef>
+        </p:style>
+        <p:txBody>
+          <a:bodyPr lIns="0" tIns="0" rIns="0" bIns="0" rtlCol="0" anchor="ctr"/>
+          <a:lstStyle/>
+          <a:p>
+            <a:pPr algn="ctr"/>
+            <a:r>
+              <a:rPr lang="es-CO" dirty="0" smtClean="0"/>
+              <a:t>X</a:t>
+            </a:r>
+            <a:r>
+              <a:rPr lang="es-CO" baseline="-25000" dirty="0" smtClean="0"/>
+              <a:t>1</a:t>
+            </a:r>
+            <a:endParaRPr lang="es-MX" baseline="-25000" dirty="0"/>
+          </a:p>
+        </p:txBody>
+      </p:sp>
+      <p:sp>
+        <p:nvSpPr>
+          <p:cNvPr id="18" name="17 Elipse"/>
+          <p:cNvSpPr/>
+          <p:nvPr/>
+        </p:nvSpPr>
+        <p:spPr>
+          <a:xfrm>
+            <a:off x="2615196" y="2259320"/>
+            <a:ext cx="504056" cy="504056"/>
+          </a:xfrm>
+          <a:prstGeom prst="ellipse">
+            <a:avLst/>
+          </a:prstGeom>
+        </p:spPr>
+        <p:style>
+          <a:lnRef idx="2">
+            <a:schemeClr val="accent1">
+              <a:shade val="50000"/>
+            </a:schemeClr>
+          </a:lnRef>
+          <a:fillRef idx="1">
+            <a:schemeClr val="accent1"/>
+          </a:fillRef>
+          <a:effectRef idx="0">
+            <a:schemeClr val="accent1"/>
+          </a:effectRef>
+          <a:fontRef idx="minor">
+            <a:schemeClr val="lt1"/>
+          </a:fontRef>
+        </p:style>
+        <p:txBody>
+          <a:bodyPr lIns="0" tIns="0" rIns="0" bIns="0" rtlCol="0" anchor="ctr"/>
+          <a:lstStyle/>
+          <a:p>
+            <a:pPr algn="ctr"/>
+            <a:r>
+              <a:rPr lang="es-CO" dirty="0" smtClean="0"/>
+              <a:t>X</a:t>
+            </a:r>
+            <a:r>
+              <a:rPr lang="es-CO" baseline="-25000" dirty="0" smtClean="0"/>
+              <a:t>2</a:t>
+            </a:r>
+            <a:endParaRPr lang="es-MX" baseline="-25000" dirty="0"/>
+          </a:p>
+        </p:txBody>
+      </p:sp>
+      <p:sp>
+        <p:nvSpPr>
+          <p:cNvPr id="19" name="18 Elipse"/>
+          <p:cNvSpPr/>
+          <p:nvPr/>
+        </p:nvSpPr>
+        <p:spPr>
+          <a:xfrm>
+            <a:off x="3335276" y="2259320"/>
+            <a:ext cx="504056" cy="504056"/>
+          </a:xfrm>
+          <a:prstGeom prst="ellipse">
+            <a:avLst/>
+          </a:prstGeom>
+        </p:spPr>
+        <p:style>
+          <a:lnRef idx="2">
+            <a:schemeClr val="accent1">
+              <a:shade val="50000"/>
+            </a:schemeClr>
+          </a:lnRef>
+          <a:fillRef idx="1">
+            <a:schemeClr val="accent1"/>
+          </a:fillRef>
+          <a:effectRef idx="0">
+            <a:schemeClr val="accent1"/>
+          </a:effectRef>
+          <a:fontRef idx="minor">
+            <a:schemeClr val="lt1"/>
+          </a:fontRef>
+        </p:style>
+        <p:txBody>
+          <a:bodyPr lIns="0" tIns="0" rIns="0" bIns="0" rtlCol="0" anchor="ctr"/>
+          <a:lstStyle/>
+          <a:p>
+            <a:pPr algn="ctr"/>
+            <a:r>
+              <a:rPr lang="es-CO" dirty="0" smtClean="0"/>
+              <a:t>X</a:t>
+            </a:r>
+            <a:r>
+              <a:rPr lang="es-CO" baseline="-25000" dirty="0" smtClean="0"/>
+              <a:t>3</a:t>
+            </a:r>
+            <a:endParaRPr lang="es-MX" baseline="-25000" dirty="0"/>
+          </a:p>
+        </p:txBody>
+      </p:sp>
+      <p:sp>
+        <p:nvSpPr>
+          <p:cNvPr id="20" name="19 Elipse"/>
+          <p:cNvSpPr/>
+          <p:nvPr/>
+        </p:nvSpPr>
+        <p:spPr>
+          <a:xfrm>
+            <a:off x="4415396" y="2259320"/>
+            <a:ext cx="504056" cy="504056"/>
+          </a:xfrm>
+          <a:prstGeom prst="ellipse">
+            <a:avLst/>
+          </a:prstGeom>
+        </p:spPr>
+        <p:style>
+          <a:lnRef idx="2">
+            <a:schemeClr val="accent1">
+              <a:shade val="50000"/>
+            </a:schemeClr>
+          </a:lnRef>
+          <a:fillRef idx="1">
+            <a:schemeClr val="accent1"/>
+          </a:fillRef>
+          <a:effectRef idx="0">
+            <a:schemeClr val="accent1"/>
+          </a:effectRef>
+          <a:fontRef idx="minor">
+            <a:schemeClr val="lt1"/>
+          </a:fontRef>
+        </p:style>
+        <p:txBody>
+          <a:bodyPr lIns="0" tIns="0" rIns="0" bIns="0" rtlCol="0" anchor="ctr"/>
+          <a:lstStyle/>
+          <a:p>
+            <a:pPr algn="ctr"/>
+            <a:r>
+              <a:rPr lang="es-CO" dirty="0" err="1" smtClean="0"/>
+              <a:t>X</a:t>
+            </a:r>
+            <a:r>
+              <a:rPr lang="es-CO" baseline="-25000" dirty="0" err="1" smtClean="0"/>
+              <a:t>n</a:t>
+            </a:r>
+            <a:endParaRPr lang="es-MX" baseline="-25000" dirty="0"/>
+          </a:p>
+        </p:txBody>
+      </p:sp>
+      <p:sp>
+        <p:nvSpPr>
+          <p:cNvPr id="21" name="TextBox 11"/>
+          <p:cNvSpPr txBox="1"/>
+          <p:nvPr/>
+        </p:nvSpPr>
+        <p:spPr>
+          <a:xfrm>
+            <a:off x="3920181" y="2233920"/>
+            <a:ext cx="434171" cy="461665"/>
+          </a:xfrm>
+          <a:prstGeom prst="rect">
+            <a:avLst/>
+          </a:prstGeom>
+          <a:noFill/>
+        </p:spPr>
+        <p:txBody>
+          <a:bodyPr vert="horz" wrap="square" rtlCol="0">
+            <a:spAutoFit/>
+          </a:bodyPr>
+          <a:lstStyle/>
+          <a:p>
+            <a:pPr algn="ctr"/>
+            <a:r>
+              <a:rPr lang="en-US" sz="2400" b="1" dirty="0" smtClean="0">
+                <a:effectLst>
+                  <a:glow rad="76200">
+                    <a:schemeClr val="bg1">
+                      <a:alpha val="70000"/>
+                    </a:schemeClr>
+                  </a:glow>
+                </a:effectLst>
+                <a:ea typeface="Verdana" panose="020B0604030504040204" pitchFamily="34" charset="0"/>
+                <a:cs typeface="Verdana" panose="020B0604030504040204" pitchFamily="34" charset="0"/>
+              </a:rPr>
+              <a:t>…</a:t>
+            </a:r>
+            <a:endParaRPr lang="en-US" sz="2400" b="1" dirty="0">
+              <a:effectLst>
+                <a:glow rad="76200">
+                  <a:schemeClr val="bg1">
+                    <a:alpha val="70000"/>
+                  </a:schemeClr>
+                </a:glow>
+              </a:effectLst>
+              <a:ea typeface="Verdana" panose="020B0604030504040204" pitchFamily="34" charset="0"/>
+              <a:cs typeface="Verdana" panose="020B0604030504040204" pitchFamily="34" charset="0"/>
+            </a:endParaRPr>
+          </a:p>
+        </p:txBody>
+      </p:sp>
+      <p:sp>
+        <p:nvSpPr>
+          <p:cNvPr id="22" name="21 Elipse"/>
+          <p:cNvSpPr/>
+          <p:nvPr/>
+        </p:nvSpPr>
+        <p:spPr>
+          <a:xfrm>
+            <a:off x="1895116" y="1276608"/>
+            <a:ext cx="504056" cy="504056"/>
+          </a:xfrm>
+          <a:prstGeom prst="ellipse">
+            <a:avLst/>
+          </a:prstGeom>
+          <a:solidFill>
+            <a:schemeClr val="accent6"/>
+          </a:solidFill>
+          <a:ln>
+            <a:solidFill>
+              <a:schemeClr val="accent6">
+                <a:lumMod val="50000"/>
+              </a:schemeClr>
+            </a:solidFill>
+          </a:ln>
+        </p:spPr>
+        <p:style>
+          <a:lnRef idx="2">
+            <a:schemeClr val="accent1">
+              <a:shade val="50000"/>
+            </a:schemeClr>
+          </a:lnRef>
+          <a:fillRef idx="1">
+            <a:schemeClr val="accent1"/>
+          </a:fillRef>
+          <a:effectRef idx="0">
+            <a:schemeClr val="accent1"/>
+          </a:effectRef>
+          <a:fontRef idx="minor">
+            <a:schemeClr val="lt1"/>
+          </a:fontRef>
+        </p:style>
+        <p:txBody>
+          <a:bodyPr lIns="0" tIns="0" rIns="0" bIns="0" rtlCol="0" anchor="ctr"/>
+          <a:lstStyle/>
+          <a:p>
+            <a:pPr algn="ctr"/>
+            <a:r>
+              <a:rPr lang="es-CO" i="1" dirty="0" smtClean="0"/>
+              <a:t>X</a:t>
+            </a:r>
+            <a:r>
+              <a:rPr lang="es-CO" baseline="-25000" dirty="0" smtClean="0"/>
+              <a:t>1</a:t>
+            </a:r>
+            <a:endParaRPr lang="es-MX" baseline="-25000" dirty="0"/>
+          </a:p>
+        </p:txBody>
+      </p:sp>
+      <p:sp>
+        <p:nvSpPr>
+          <p:cNvPr id="23" name="22 Elipse"/>
+          <p:cNvSpPr/>
+          <p:nvPr/>
+        </p:nvSpPr>
+        <p:spPr>
+          <a:xfrm>
+            <a:off x="2615196" y="1276608"/>
+            <a:ext cx="504056" cy="504056"/>
+          </a:xfrm>
+          <a:prstGeom prst="ellipse">
+            <a:avLst/>
+          </a:prstGeom>
+          <a:solidFill>
+            <a:schemeClr val="accent6"/>
+          </a:solidFill>
+          <a:ln>
+            <a:solidFill>
+              <a:schemeClr val="accent6">
+                <a:lumMod val="50000"/>
+              </a:schemeClr>
+            </a:solidFill>
+          </a:ln>
+        </p:spPr>
+        <p:style>
+          <a:lnRef idx="2">
+            <a:schemeClr val="accent1">
+              <a:shade val="50000"/>
+            </a:schemeClr>
+          </a:lnRef>
+          <a:fillRef idx="1">
+            <a:schemeClr val="accent1"/>
+          </a:fillRef>
+          <a:effectRef idx="0">
+            <a:schemeClr val="accent1"/>
+          </a:effectRef>
+          <a:fontRef idx="minor">
+            <a:schemeClr val="lt1"/>
+          </a:fontRef>
+        </p:style>
+        <p:txBody>
+          <a:bodyPr lIns="0" tIns="0" rIns="0" bIns="0" rtlCol="0" anchor="ctr"/>
+          <a:lstStyle/>
+          <a:p>
+            <a:pPr algn="ctr"/>
+            <a:r>
+              <a:rPr lang="es-CO" i="1" dirty="0" smtClean="0"/>
+              <a:t>X</a:t>
+            </a:r>
+            <a:r>
+              <a:rPr lang="es-CO" baseline="-25000" dirty="0" smtClean="0"/>
+              <a:t>2</a:t>
+            </a:r>
+            <a:endParaRPr lang="es-MX" baseline="-25000" dirty="0"/>
+          </a:p>
+        </p:txBody>
+      </p:sp>
+      <p:sp>
+        <p:nvSpPr>
+          <p:cNvPr id="24" name="23 Elipse"/>
+          <p:cNvSpPr/>
+          <p:nvPr/>
+        </p:nvSpPr>
+        <p:spPr>
+          <a:xfrm>
+            <a:off x="3335276" y="1276608"/>
+            <a:ext cx="504056" cy="504056"/>
+          </a:xfrm>
+          <a:prstGeom prst="ellipse">
+            <a:avLst/>
+          </a:prstGeom>
+          <a:solidFill>
+            <a:schemeClr val="accent6"/>
+          </a:solidFill>
+          <a:ln>
+            <a:solidFill>
+              <a:schemeClr val="accent6">
+                <a:lumMod val="50000"/>
+              </a:schemeClr>
+            </a:solidFill>
+          </a:ln>
+        </p:spPr>
+        <p:style>
+          <a:lnRef idx="2">
+            <a:schemeClr val="accent1">
+              <a:shade val="50000"/>
+            </a:schemeClr>
+          </a:lnRef>
+          <a:fillRef idx="1">
+            <a:schemeClr val="accent1"/>
+          </a:fillRef>
+          <a:effectRef idx="0">
+            <a:schemeClr val="accent1"/>
+          </a:effectRef>
+          <a:fontRef idx="minor">
+            <a:schemeClr val="lt1"/>
+          </a:fontRef>
+        </p:style>
+        <p:txBody>
+          <a:bodyPr lIns="0" tIns="0" rIns="0" bIns="0" rtlCol="0" anchor="ctr"/>
+          <a:lstStyle/>
+          <a:p>
+            <a:pPr algn="ctr"/>
+            <a:r>
+              <a:rPr lang="es-CO" i="1" dirty="0" smtClean="0"/>
+              <a:t>X</a:t>
+            </a:r>
+            <a:r>
+              <a:rPr lang="es-CO" baseline="-25000" dirty="0" smtClean="0"/>
+              <a:t>3</a:t>
+            </a:r>
+            <a:endParaRPr lang="es-MX" baseline="-25000" dirty="0"/>
+          </a:p>
+        </p:txBody>
+      </p:sp>
+      <p:sp>
+        <p:nvSpPr>
+          <p:cNvPr id="25" name="24 Elipse"/>
+          <p:cNvSpPr/>
+          <p:nvPr/>
+        </p:nvSpPr>
+        <p:spPr>
+          <a:xfrm>
+            <a:off x="4415396" y="1276608"/>
+            <a:ext cx="504056" cy="504056"/>
+          </a:xfrm>
+          <a:prstGeom prst="ellipse">
+            <a:avLst/>
+          </a:prstGeom>
+          <a:solidFill>
+            <a:schemeClr val="accent6"/>
+          </a:solidFill>
+          <a:ln>
+            <a:solidFill>
+              <a:schemeClr val="accent6">
+                <a:lumMod val="50000"/>
+              </a:schemeClr>
+            </a:solidFill>
+          </a:ln>
+        </p:spPr>
+        <p:style>
+          <a:lnRef idx="2">
+            <a:schemeClr val="accent1">
+              <a:shade val="50000"/>
+            </a:schemeClr>
+          </a:lnRef>
+          <a:fillRef idx="1">
+            <a:schemeClr val="accent1"/>
+          </a:fillRef>
+          <a:effectRef idx="0">
+            <a:schemeClr val="accent1"/>
+          </a:effectRef>
+          <a:fontRef idx="minor">
+            <a:schemeClr val="lt1"/>
+          </a:fontRef>
+        </p:style>
+        <p:txBody>
+          <a:bodyPr lIns="0" tIns="0" rIns="0" bIns="0" rtlCol="0" anchor="ctr"/>
+          <a:lstStyle/>
+          <a:p>
+            <a:pPr algn="ctr"/>
+            <a:r>
+              <a:rPr lang="es-CO" i="1" dirty="0" err="1" smtClean="0"/>
+              <a:t>X</a:t>
+            </a:r>
+            <a:r>
+              <a:rPr lang="es-CO" baseline="-25000" dirty="0" err="1" smtClean="0"/>
+              <a:t>n</a:t>
+            </a:r>
+            <a:endParaRPr lang="es-MX" baseline="-25000" dirty="0"/>
+          </a:p>
+        </p:txBody>
+      </p:sp>
+      <p:sp>
+        <p:nvSpPr>
+          <p:cNvPr id="26" name="TextBox 11"/>
+          <p:cNvSpPr txBox="1"/>
+          <p:nvPr/>
+        </p:nvSpPr>
+        <p:spPr>
+          <a:xfrm>
+            <a:off x="3920181" y="1251208"/>
+            <a:ext cx="434171" cy="461665"/>
+          </a:xfrm>
+          <a:prstGeom prst="rect">
+            <a:avLst/>
+          </a:prstGeom>
+          <a:noFill/>
+        </p:spPr>
+        <p:txBody>
+          <a:bodyPr vert="horz" wrap="square" rtlCol="0">
+            <a:spAutoFit/>
+          </a:bodyPr>
+          <a:lstStyle/>
+          <a:p>
+            <a:pPr algn="ctr"/>
+            <a:r>
+              <a:rPr lang="en-US" sz="2400" b="1" dirty="0" smtClean="0">
+                <a:effectLst>
+                  <a:glow rad="76200">
+                    <a:schemeClr val="bg1">
+                      <a:alpha val="70000"/>
+                    </a:schemeClr>
+                  </a:glow>
+                </a:effectLst>
+                <a:ea typeface="Verdana" panose="020B0604030504040204" pitchFamily="34" charset="0"/>
+                <a:cs typeface="Verdana" panose="020B0604030504040204" pitchFamily="34" charset="0"/>
+              </a:rPr>
+              <a:t>…</a:t>
+            </a:r>
+            <a:endParaRPr lang="en-US" sz="2400" b="1" dirty="0">
+              <a:effectLst>
+                <a:glow rad="76200">
+                  <a:schemeClr val="bg1">
+                    <a:alpha val="70000"/>
+                  </a:schemeClr>
+                </a:glow>
+              </a:effectLst>
+              <a:ea typeface="Verdana" panose="020B0604030504040204" pitchFamily="34" charset="0"/>
+              <a:cs typeface="Verdana" panose="020B0604030504040204" pitchFamily="34" charset="0"/>
+            </a:endParaRPr>
+          </a:p>
+        </p:txBody>
+      </p:sp>
+      <p:cxnSp>
+        <p:nvCxnSpPr>
+          <p:cNvPr id="14" name="13 Conector recto de flecha"/>
+          <p:cNvCxnSpPr>
+            <a:stCxn id="22" idx="4"/>
+            <a:endCxn id="5" idx="0"/>
+          </p:cNvCxnSpPr>
+          <p:nvPr/>
+        </p:nvCxnSpPr>
+        <p:spPr>
+          <a:xfrm>
+            <a:off x="2147144" y="1780664"/>
+            <a:ext cx="0" cy="478656"/>
+          </a:xfrm>
+          <a:prstGeom prst="straightConnector1">
+            <a:avLst/>
+          </a:prstGeom>
+          <a:ln w="38100">
+            <a:solidFill>
+              <a:schemeClr val="accent6">
+                <a:lumMod val="75000"/>
+              </a:schemeClr>
+            </a:solidFill>
+            <a:tailEnd type="arrow"/>
+          </a:ln>
+        </p:spPr>
+        <p:style>
+          <a:lnRef idx="1">
+            <a:schemeClr val="accent1"/>
+          </a:lnRef>
+          <a:fillRef idx="0">
+            <a:schemeClr val="accent1"/>
+          </a:fillRef>
+          <a:effectRef idx="0">
+            <a:schemeClr val="accent1"/>
+          </a:effectRef>
+          <a:fontRef idx="minor">
+            <a:schemeClr val="tx1"/>
+          </a:fontRef>
+        </p:style>
+      </p:cxnSp>
+      <p:cxnSp>
+        <p:nvCxnSpPr>
+          <p:cNvPr id="28" name="27 Conector recto de flecha"/>
+          <p:cNvCxnSpPr>
+            <a:stCxn id="23" idx="4"/>
+            <a:endCxn id="18" idx="0"/>
+          </p:cNvCxnSpPr>
+          <p:nvPr/>
+        </p:nvCxnSpPr>
+        <p:spPr>
+          <a:xfrm>
+            <a:off x="2867224" y="1780664"/>
+            <a:ext cx="0" cy="478656"/>
+          </a:xfrm>
+          <a:prstGeom prst="straightConnector1">
+            <a:avLst/>
+          </a:prstGeom>
+          <a:ln w="38100">
+            <a:solidFill>
+              <a:schemeClr val="accent6">
+                <a:lumMod val="75000"/>
+              </a:schemeClr>
+            </a:solidFill>
+            <a:tailEnd type="arrow"/>
+          </a:ln>
+        </p:spPr>
+        <p:style>
+          <a:lnRef idx="1">
+            <a:schemeClr val="accent1"/>
+          </a:lnRef>
+          <a:fillRef idx="0">
+            <a:schemeClr val="accent1"/>
+          </a:fillRef>
+          <a:effectRef idx="0">
+            <a:schemeClr val="accent1"/>
+          </a:effectRef>
+          <a:fontRef idx="minor">
+            <a:schemeClr val="tx1"/>
+          </a:fontRef>
+        </p:style>
+      </p:cxnSp>
+      <p:cxnSp>
+        <p:nvCxnSpPr>
+          <p:cNvPr id="31" name="30 Conector recto de flecha"/>
+          <p:cNvCxnSpPr>
+            <a:stCxn id="24" idx="4"/>
+            <a:endCxn id="19" idx="0"/>
+          </p:cNvCxnSpPr>
+          <p:nvPr/>
+        </p:nvCxnSpPr>
+        <p:spPr>
+          <a:xfrm>
+            <a:off x="3587304" y="1780664"/>
+            <a:ext cx="0" cy="478656"/>
+          </a:xfrm>
+          <a:prstGeom prst="straightConnector1">
+            <a:avLst/>
+          </a:prstGeom>
+          <a:ln w="38100">
+            <a:solidFill>
+              <a:schemeClr val="accent6">
+                <a:lumMod val="75000"/>
+              </a:schemeClr>
+            </a:solidFill>
+            <a:tailEnd type="arrow"/>
+          </a:ln>
+        </p:spPr>
+        <p:style>
+          <a:lnRef idx="1">
+            <a:schemeClr val="accent1"/>
+          </a:lnRef>
+          <a:fillRef idx="0">
+            <a:schemeClr val="accent1"/>
+          </a:fillRef>
+          <a:effectRef idx="0">
+            <a:schemeClr val="accent1"/>
+          </a:effectRef>
+          <a:fontRef idx="minor">
+            <a:schemeClr val="tx1"/>
+          </a:fontRef>
+        </p:style>
+      </p:cxnSp>
+      <p:cxnSp>
+        <p:nvCxnSpPr>
+          <p:cNvPr id="34" name="33 Conector recto de flecha"/>
+          <p:cNvCxnSpPr>
+            <a:stCxn id="25" idx="4"/>
+            <a:endCxn id="20" idx="0"/>
+          </p:cNvCxnSpPr>
+          <p:nvPr/>
+        </p:nvCxnSpPr>
+        <p:spPr>
+          <a:xfrm>
+            <a:off x="4667424" y="1780664"/>
+            <a:ext cx="0" cy="478656"/>
+          </a:xfrm>
+          <a:prstGeom prst="straightConnector1">
+            <a:avLst/>
+          </a:prstGeom>
+          <a:ln w="38100">
+            <a:solidFill>
+              <a:schemeClr val="accent6">
+                <a:lumMod val="75000"/>
+              </a:schemeClr>
+            </a:solidFill>
+            <a:tailEnd type="arrow"/>
+          </a:ln>
+        </p:spPr>
+        <p:style>
+          <a:lnRef idx="1">
+            <a:schemeClr val="accent1"/>
+          </a:lnRef>
+          <a:fillRef idx="0">
+            <a:schemeClr val="accent1"/>
+          </a:fillRef>
+          <a:effectRef idx="0">
+            <a:schemeClr val="accent1"/>
+          </a:effectRef>
+          <a:fontRef idx="minor">
+            <a:schemeClr val="tx1"/>
+          </a:fontRef>
+        </p:style>
+      </p:cxnSp>
+      <p:sp>
+        <p:nvSpPr>
+          <p:cNvPr id="38" name="TextBox 3"/>
+          <p:cNvSpPr txBox="1"/>
+          <p:nvPr/>
+        </p:nvSpPr>
+        <p:spPr>
+          <a:xfrm>
+            <a:off x="5207484" y="1173108"/>
+            <a:ext cx="2448272" cy="369332"/>
+          </a:xfrm>
+          <a:prstGeom prst="rect">
+            <a:avLst/>
+          </a:prstGeom>
+          <a:noFill/>
+        </p:spPr>
+        <p:txBody>
+          <a:bodyPr wrap="square" rtlCol="0">
+            <a:spAutoFit/>
+          </a:bodyPr>
+          <a:lstStyle/>
+          <a:p>
+            <a:r>
+              <a:rPr lang="en-US" dirty="0" smtClean="0"/>
+              <a:t>Time = </a:t>
+            </a:r>
+            <a:r>
+              <a:rPr lang="en-US" i="1" dirty="0" smtClean="0"/>
+              <a:t>t</a:t>
+            </a:r>
+            <a:r>
+              <a:rPr lang="en-US" dirty="0" smtClean="0"/>
+              <a:t> - </a:t>
+            </a:r>
+            <a:r>
+              <a:rPr lang="en-US" i="1" dirty="0" smtClean="0"/>
+              <a:t>p</a:t>
+            </a:r>
+            <a:r>
+              <a:rPr lang="en-US" dirty="0" smtClean="0"/>
+              <a:t> … </a:t>
+            </a:r>
+            <a:r>
+              <a:rPr lang="en-US" i="1" dirty="0" smtClean="0"/>
+              <a:t>t</a:t>
+            </a:r>
+            <a:r>
+              <a:rPr lang="en-US" dirty="0" smtClean="0"/>
+              <a:t> - 1</a:t>
+            </a:r>
+            <a:endParaRPr lang="en-US" dirty="0"/>
+          </a:p>
+        </p:txBody>
+      </p:sp>
+      <p:sp>
+        <p:nvSpPr>
+          <p:cNvPr id="39" name="TextBox 3"/>
+          <p:cNvSpPr txBox="1"/>
+          <p:nvPr/>
+        </p:nvSpPr>
+        <p:spPr>
+          <a:xfrm>
+            <a:off x="5207484" y="2178020"/>
+            <a:ext cx="2448272" cy="369332"/>
+          </a:xfrm>
+          <a:prstGeom prst="rect">
+            <a:avLst/>
+          </a:prstGeom>
+          <a:noFill/>
+        </p:spPr>
+        <p:txBody>
+          <a:bodyPr wrap="square" rtlCol="0">
+            <a:spAutoFit/>
+          </a:bodyPr>
+          <a:lstStyle/>
+          <a:p>
+            <a:r>
+              <a:rPr lang="en-US" dirty="0" smtClean="0"/>
+              <a:t>Time = </a:t>
+            </a:r>
+            <a:r>
+              <a:rPr lang="en-US" i="1" dirty="0" smtClean="0"/>
+              <a:t>t</a:t>
+            </a:r>
+            <a:endParaRPr lang="en-US" i="1" dirty="0"/>
+          </a:p>
+        </p:txBody>
+      </p:sp>
+      <p:sp>
+        <p:nvSpPr>
+          <p:cNvPr id="40" name="TextBox 3"/>
+          <p:cNvSpPr txBox="1"/>
+          <p:nvPr/>
+        </p:nvSpPr>
+        <p:spPr>
+          <a:xfrm>
+            <a:off x="5211676" y="2466052"/>
+            <a:ext cx="2448272" cy="369332"/>
+          </a:xfrm>
+          <a:prstGeom prst="rect">
+            <a:avLst/>
+          </a:prstGeom>
+          <a:noFill/>
+        </p:spPr>
+        <p:txBody>
+          <a:bodyPr wrap="square" rtlCol="0">
+            <a:spAutoFit/>
+          </a:bodyPr>
+          <a:lstStyle/>
+          <a:p>
+            <a:r>
+              <a:rPr lang="en-US" dirty="0" smtClean="0"/>
+              <a:t>Cell = (</a:t>
+            </a:r>
+            <a:r>
+              <a:rPr lang="en-US" i="1" dirty="0" smtClean="0"/>
+              <a:t>x</a:t>
+            </a:r>
+            <a:r>
+              <a:rPr lang="en-US" dirty="0" smtClean="0"/>
+              <a:t>, </a:t>
+            </a:r>
+            <a:r>
+              <a:rPr lang="en-US" i="1" dirty="0" smtClean="0"/>
+              <a:t>y</a:t>
+            </a:r>
+            <a:r>
+              <a:rPr lang="en-US" dirty="0" smtClean="0"/>
+              <a:t>)</a:t>
+            </a:r>
+            <a:endParaRPr lang="en-US" dirty="0"/>
+          </a:p>
+        </p:txBody>
+      </p:sp>
+      <p:sp>
+        <p:nvSpPr>
+          <p:cNvPr id="43" name="TextBox 3"/>
+          <p:cNvSpPr txBox="1"/>
+          <p:nvPr/>
+        </p:nvSpPr>
+        <p:spPr>
+          <a:xfrm>
+            <a:off x="1069238" y="937528"/>
+            <a:ext cx="444636" cy="461665"/>
+          </a:xfrm>
+          <a:prstGeom prst="rect">
+            <a:avLst/>
+          </a:prstGeom>
+          <a:noFill/>
+        </p:spPr>
+        <p:txBody>
+          <a:bodyPr wrap="square" rtlCol="0">
+            <a:spAutoFit/>
+          </a:bodyPr>
+          <a:lstStyle/>
+          <a:p>
+            <a:r>
+              <a:rPr lang="en-US" sz="2400" dirty="0" smtClean="0"/>
+              <a:t>a.</a:t>
+            </a:r>
+            <a:endParaRPr lang="en-US" sz="2400" dirty="0"/>
+          </a:p>
+        </p:txBody>
+      </p:sp>
+      <p:sp>
+        <p:nvSpPr>
+          <p:cNvPr id="44" name="TextBox 3"/>
+          <p:cNvSpPr txBox="1"/>
+          <p:nvPr/>
+        </p:nvSpPr>
+        <p:spPr>
+          <a:xfrm>
+            <a:off x="1069238" y="3284984"/>
+            <a:ext cx="444636" cy="461665"/>
+          </a:xfrm>
+          <a:prstGeom prst="rect">
+            <a:avLst/>
+          </a:prstGeom>
+          <a:noFill/>
+        </p:spPr>
+        <p:txBody>
+          <a:bodyPr wrap="square" rtlCol="0">
+            <a:spAutoFit/>
+          </a:bodyPr>
+          <a:lstStyle/>
+          <a:p>
+            <a:r>
+              <a:rPr lang="en-US" sz="2400" dirty="0"/>
+              <a:t>b</a:t>
+            </a:r>
+            <a:r>
+              <a:rPr lang="en-US" sz="2400" dirty="0" smtClean="0"/>
+              <a:t>.</a:t>
+            </a:r>
+            <a:endParaRPr lang="en-US" sz="2400" dirty="0"/>
+          </a:p>
+        </p:txBody>
+      </p:sp>
+      <p:sp>
+        <p:nvSpPr>
+          <p:cNvPr id="45" name="44 Rectángulo"/>
+          <p:cNvSpPr/>
+          <p:nvPr/>
+        </p:nvSpPr>
+        <p:spPr>
+          <a:xfrm>
+            <a:off x="1704492" y="2987660"/>
+            <a:ext cx="3430984" cy="1343536"/>
+          </a:xfrm>
+          <a:prstGeom prst="rect">
+            <a:avLst/>
+          </a:prstGeom>
+          <a:solidFill>
+            <a:schemeClr val="accent3">
+              <a:lumMod val="40000"/>
+              <a:lumOff val="60000"/>
+            </a:schemeClr>
+          </a:solidFill>
+          <a:ln>
+            <a:solidFill>
+              <a:schemeClr val="accent3"/>
+            </a:solidFill>
+          </a:ln>
+        </p:spPr>
+        <p:style>
+          <a:lnRef idx="2">
+            <a:schemeClr val="accent1">
+              <a:shade val="50000"/>
+            </a:schemeClr>
+          </a:lnRef>
+          <a:fillRef idx="1">
+            <a:schemeClr val="accent1"/>
+          </a:fillRef>
+          <a:effectRef idx="0">
+            <a:schemeClr val="accent1"/>
+          </a:effectRef>
+          <a:fontRef idx="minor">
+            <a:schemeClr val="lt1"/>
+          </a:fontRef>
+        </p:style>
+        <p:txBody>
+          <a:bodyPr rtlCol="0" anchor="ctr"/>
+          <a:lstStyle/>
+          <a:p>
+            <a:pPr algn="ctr"/>
+            <a:endParaRPr lang="es-MX"/>
+          </a:p>
+        </p:txBody>
+      </p:sp>
+      <p:sp>
+        <p:nvSpPr>
+          <p:cNvPr id="46" name="45 Rectángulo"/>
+          <p:cNvSpPr/>
+          <p:nvPr/>
+        </p:nvSpPr>
+        <p:spPr>
+          <a:xfrm>
+            <a:off x="1801900" y="3454400"/>
+            <a:ext cx="5349800" cy="792088"/>
+          </a:xfrm>
+          <a:prstGeom prst="rect">
+            <a:avLst/>
+          </a:prstGeom>
+          <a:solidFill>
+            <a:schemeClr val="accent2">
+              <a:lumMod val="60000"/>
+              <a:lumOff val="40000"/>
+              <a:alpha val="50000"/>
+            </a:schemeClr>
+          </a:solidFill>
+          <a:ln>
+            <a:solidFill>
+              <a:schemeClr val="accent2"/>
+            </a:solidFill>
+          </a:ln>
+        </p:spPr>
+        <p:style>
+          <a:lnRef idx="2">
+            <a:schemeClr val="accent1">
+              <a:shade val="50000"/>
+            </a:schemeClr>
+          </a:lnRef>
+          <a:fillRef idx="1">
+            <a:schemeClr val="accent1"/>
+          </a:fillRef>
+          <a:effectRef idx="0">
+            <a:schemeClr val="accent1"/>
+          </a:effectRef>
+          <a:fontRef idx="minor">
+            <a:schemeClr val="lt1"/>
+          </a:fontRef>
+        </p:style>
+        <p:txBody>
+          <a:bodyPr rtlCol="0" anchor="ctr"/>
+          <a:lstStyle/>
+          <a:p>
+            <a:pPr algn="ctr"/>
+            <a:endParaRPr lang="es-MX"/>
+          </a:p>
+        </p:txBody>
+      </p:sp>
+      <p:sp>
+        <p:nvSpPr>
+          <p:cNvPr id="56" name="TextBox 11"/>
+          <p:cNvSpPr txBox="1"/>
+          <p:nvPr/>
+        </p:nvSpPr>
+        <p:spPr>
+          <a:xfrm>
+            <a:off x="3920181" y="3573016"/>
+            <a:ext cx="434171" cy="461665"/>
+          </a:xfrm>
+          <a:prstGeom prst="rect">
+            <a:avLst/>
+          </a:prstGeom>
+          <a:noFill/>
+        </p:spPr>
+        <p:txBody>
+          <a:bodyPr vert="horz" wrap="square" rtlCol="0">
+            <a:spAutoFit/>
+          </a:bodyPr>
+          <a:lstStyle/>
+          <a:p>
+            <a:pPr algn="ctr"/>
+            <a:r>
+              <a:rPr lang="en-US" sz="2400" b="1" dirty="0" smtClean="0">
+                <a:effectLst>
+                  <a:glow rad="76200">
+                    <a:schemeClr val="bg1">
+                      <a:alpha val="70000"/>
+                    </a:schemeClr>
+                  </a:glow>
+                </a:effectLst>
+                <a:ea typeface="Verdana" panose="020B0604030504040204" pitchFamily="34" charset="0"/>
+                <a:cs typeface="Verdana" panose="020B0604030504040204" pitchFamily="34" charset="0"/>
+              </a:rPr>
+              <a:t>…</a:t>
+            </a:r>
+            <a:endParaRPr lang="en-US" sz="2400" b="1" dirty="0">
+              <a:effectLst>
+                <a:glow rad="76200">
+                  <a:schemeClr val="bg1">
+                    <a:alpha val="70000"/>
+                  </a:schemeClr>
+                </a:glow>
+              </a:effectLst>
+              <a:ea typeface="Verdana" panose="020B0604030504040204" pitchFamily="34" charset="0"/>
+              <a:cs typeface="Verdana" panose="020B0604030504040204" pitchFamily="34" charset="0"/>
+            </a:endParaRPr>
+          </a:p>
+        </p:txBody>
+      </p:sp>
+      <p:sp>
+        <p:nvSpPr>
+          <p:cNvPr id="61" name="TextBox 3"/>
+          <p:cNvSpPr txBox="1"/>
+          <p:nvPr/>
+        </p:nvSpPr>
+        <p:spPr>
+          <a:xfrm>
+            <a:off x="5207484" y="3779748"/>
+            <a:ext cx="2448272" cy="369332"/>
+          </a:xfrm>
+          <a:prstGeom prst="rect">
+            <a:avLst/>
+          </a:prstGeom>
+          <a:noFill/>
+        </p:spPr>
+        <p:txBody>
+          <a:bodyPr wrap="square" rtlCol="0">
+            <a:spAutoFit/>
+          </a:bodyPr>
+          <a:lstStyle/>
+          <a:p>
+            <a:r>
+              <a:rPr lang="en-US" dirty="0" smtClean="0"/>
+              <a:t>Time = </a:t>
+            </a:r>
+            <a:r>
+              <a:rPr lang="en-US" i="1" dirty="0" smtClean="0"/>
+              <a:t>t</a:t>
+            </a:r>
+            <a:r>
+              <a:rPr lang="en-US" dirty="0" smtClean="0"/>
+              <a:t> - </a:t>
+            </a:r>
+            <a:r>
+              <a:rPr lang="en-US" i="1" dirty="0" smtClean="0"/>
+              <a:t>p</a:t>
+            </a:r>
+            <a:r>
+              <a:rPr lang="en-US" dirty="0" smtClean="0"/>
+              <a:t> … </a:t>
+            </a:r>
+            <a:r>
+              <a:rPr lang="en-US" i="1" dirty="0" smtClean="0"/>
+              <a:t>t</a:t>
+            </a:r>
+            <a:r>
+              <a:rPr lang="en-US" dirty="0" smtClean="0"/>
+              <a:t> - 1</a:t>
+            </a:r>
+            <a:endParaRPr lang="en-US" dirty="0"/>
+          </a:p>
+        </p:txBody>
+      </p:sp>
+      <p:sp>
+        <p:nvSpPr>
+          <p:cNvPr id="62" name="TextBox 3"/>
+          <p:cNvSpPr txBox="1"/>
+          <p:nvPr/>
+        </p:nvSpPr>
+        <p:spPr>
+          <a:xfrm>
+            <a:off x="5207484" y="4499828"/>
+            <a:ext cx="2448272" cy="369332"/>
+          </a:xfrm>
+          <a:prstGeom prst="rect">
+            <a:avLst/>
+          </a:prstGeom>
+          <a:noFill/>
+        </p:spPr>
+        <p:txBody>
+          <a:bodyPr wrap="square" rtlCol="0">
+            <a:spAutoFit/>
+          </a:bodyPr>
+          <a:lstStyle/>
+          <a:p>
+            <a:r>
+              <a:rPr lang="en-US" dirty="0" smtClean="0"/>
+              <a:t>Time = </a:t>
+            </a:r>
+            <a:r>
+              <a:rPr lang="en-US" i="1" dirty="0" smtClean="0"/>
+              <a:t>t</a:t>
+            </a:r>
+            <a:endParaRPr lang="en-US" i="1" dirty="0"/>
+          </a:p>
+        </p:txBody>
+      </p:sp>
+      <p:sp>
+        <p:nvSpPr>
+          <p:cNvPr id="63" name="TextBox 3"/>
+          <p:cNvSpPr txBox="1"/>
+          <p:nvPr/>
+        </p:nvSpPr>
+        <p:spPr>
+          <a:xfrm>
+            <a:off x="5211676" y="4787860"/>
+            <a:ext cx="2448272" cy="369332"/>
+          </a:xfrm>
+          <a:prstGeom prst="rect">
+            <a:avLst/>
+          </a:prstGeom>
+          <a:noFill/>
+        </p:spPr>
+        <p:txBody>
+          <a:bodyPr wrap="square" rtlCol="0">
+            <a:spAutoFit/>
+          </a:bodyPr>
+          <a:lstStyle/>
+          <a:p>
+            <a:r>
+              <a:rPr lang="en-US" dirty="0" smtClean="0"/>
+              <a:t>Cell = (</a:t>
+            </a:r>
+            <a:r>
+              <a:rPr lang="en-US" i="1" dirty="0" smtClean="0"/>
+              <a:t>x</a:t>
+            </a:r>
+            <a:r>
+              <a:rPr lang="en-US" dirty="0" smtClean="0"/>
+              <a:t>, </a:t>
+            </a:r>
+            <a:r>
+              <a:rPr lang="en-US" i="1" dirty="0" smtClean="0"/>
+              <a:t>y</a:t>
+            </a:r>
+            <a:r>
+              <a:rPr lang="en-US" dirty="0" smtClean="0"/>
+              <a:t>)</a:t>
+            </a:r>
+            <a:endParaRPr lang="en-US" dirty="0"/>
+          </a:p>
+        </p:txBody>
+      </p:sp>
+      <p:sp>
+        <p:nvSpPr>
+          <p:cNvPr id="64" name="TextBox 3"/>
+          <p:cNvSpPr txBox="1"/>
+          <p:nvPr/>
+        </p:nvSpPr>
+        <p:spPr>
+          <a:xfrm>
+            <a:off x="1738400" y="3025760"/>
+            <a:ext cx="3333576" cy="369332"/>
+          </a:xfrm>
+          <a:prstGeom prst="rect">
+            <a:avLst/>
+          </a:prstGeom>
+          <a:noFill/>
+        </p:spPr>
+        <p:txBody>
+          <a:bodyPr wrap="square" rtlCol="0">
+            <a:spAutoFit/>
+          </a:bodyPr>
+          <a:lstStyle/>
+          <a:p>
+            <a:r>
+              <a:rPr lang="en-US" dirty="0" smtClean="0"/>
+              <a:t>Cell = (</a:t>
+            </a:r>
+            <a:r>
+              <a:rPr lang="en-US" i="1" dirty="0" smtClean="0"/>
+              <a:t>x - r … x </a:t>
+            </a:r>
+            <a:r>
+              <a:rPr lang="en-US" dirty="0" smtClean="0"/>
+              <a:t>+</a:t>
+            </a:r>
+            <a:r>
+              <a:rPr lang="en-US" i="1" dirty="0" smtClean="0"/>
+              <a:t> r</a:t>
+            </a:r>
+            <a:r>
+              <a:rPr lang="en-US" dirty="0" smtClean="0"/>
+              <a:t>, </a:t>
+            </a:r>
+            <a:r>
+              <a:rPr lang="en-US" i="1" dirty="0" smtClean="0"/>
+              <a:t>y - r … y </a:t>
+            </a:r>
+            <a:r>
+              <a:rPr lang="en-US" dirty="0" smtClean="0"/>
+              <a:t>+</a:t>
+            </a:r>
+            <a:r>
+              <a:rPr lang="en-US" i="1" dirty="0" smtClean="0"/>
+              <a:t> r</a:t>
+            </a:r>
+            <a:r>
+              <a:rPr lang="en-US" dirty="0" smtClean="0"/>
+              <a:t>)</a:t>
+            </a:r>
+            <a:endParaRPr lang="en-US" dirty="0"/>
+          </a:p>
+        </p:txBody>
+      </p:sp>
+      <p:sp>
+        <p:nvSpPr>
+          <p:cNvPr id="48" name="TextBox 3"/>
+          <p:cNvSpPr txBox="1"/>
+          <p:nvPr/>
+        </p:nvSpPr>
+        <p:spPr>
+          <a:xfrm>
+            <a:off x="5207484" y="1490424"/>
+            <a:ext cx="2448272" cy="369332"/>
+          </a:xfrm>
+          <a:prstGeom prst="rect">
+            <a:avLst/>
+          </a:prstGeom>
+          <a:noFill/>
+        </p:spPr>
+        <p:txBody>
+          <a:bodyPr wrap="square" rtlCol="0">
+            <a:spAutoFit/>
+          </a:bodyPr>
+          <a:lstStyle/>
+          <a:p>
+            <a:r>
+              <a:rPr lang="en-US" dirty="0" smtClean="0"/>
+              <a:t>Cell = (</a:t>
+            </a:r>
+            <a:r>
+              <a:rPr lang="en-US" i="1" dirty="0" smtClean="0"/>
+              <a:t>x</a:t>
+            </a:r>
+            <a:r>
+              <a:rPr lang="en-US" dirty="0" smtClean="0"/>
+              <a:t>, </a:t>
+            </a:r>
+            <a:r>
+              <a:rPr lang="en-US" i="1" dirty="0" smtClean="0"/>
+              <a:t>y</a:t>
+            </a:r>
+            <a:r>
+              <a:rPr lang="en-US" dirty="0" smtClean="0"/>
+              <a:t>)</a:t>
+            </a:r>
+            <a:endParaRPr lang="en-US" dirty="0"/>
+          </a:p>
+        </p:txBody>
+      </p:sp>
+      <p:sp>
+        <p:nvSpPr>
+          <p:cNvPr id="49" name="48 Elipse"/>
+          <p:cNvSpPr/>
+          <p:nvPr/>
+        </p:nvSpPr>
+        <p:spPr>
+          <a:xfrm>
+            <a:off x="1895116" y="4558888"/>
+            <a:ext cx="504056" cy="504056"/>
+          </a:xfrm>
+          <a:prstGeom prst="ellipse">
+            <a:avLst/>
+          </a:prstGeom>
+        </p:spPr>
+        <p:style>
+          <a:lnRef idx="2">
+            <a:schemeClr val="accent1">
+              <a:shade val="50000"/>
+            </a:schemeClr>
+          </a:lnRef>
+          <a:fillRef idx="1">
+            <a:schemeClr val="accent1"/>
+          </a:fillRef>
+          <a:effectRef idx="0">
+            <a:schemeClr val="accent1"/>
+          </a:effectRef>
+          <a:fontRef idx="minor">
+            <a:schemeClr val="lt1"/>
+          </a:fontRef>
+        </p:style>
+        <p:txBody>
+          <a:bodyPr lIns="0" tIns="0" rIns="0" bIns="0" rtlCol="0" anchor="ctr"/>
+          <a:lstStyle/>
+          <a:p>
+            <a:pPr algn="ctr"/>
+            <a:r>
+              <a:rPr lang="es-CO" dirty="0" smtClean="0"/>
+              <a:t>X</a:t>
+            </a:r>
+            <a:r>
+              <a:rPr lang="es-CO" baseline="-25000" dirty="0" smtClean="0"/>
+              <a:t>1</a:t>
+            </a:r>
+            <a:endParaRPr lang="es-MX" baseline="-25000" dirty="0"/>
+          </a:p>
+        </p:txBody>
+      </p:sp>
+      <p:sp>
+        <p:nvSpPr>
+          <p:cNvPr id="50" name="49 Elipse"/>
+          <p:cNvSpPr/>
+          <p:nvPr/>
+        </p:nvSpPr>
+        <p:spPr>
+          <a:xfrm>
+            <a:off x="2615196" y="4558888"/>
+            <a:ext cx="504056" cy="504056"/>
+          </a:xfrm>
+          <a:prstGeom prst="ellipse">
+            <a:avLst/>
+          </a:prstGeom>
+        </p:spPr>
+        <p:style>
+          <a:lnRef idx="2">
+            <a:schemeClr val="accent1">
+              <a:shade val="50000"/>
+            </a:schemeClr>
+          </a:lnRef>
+          <a:fillRef idx="1">
+            <a:schemeClr val="accent1"/>
+          </a:fillRef>
+          <a:effectRef idx="0">
+            <a:schemeClr val="accent1"/>
+          </a:effectRef>
+          <a:fontRef idx="minor">
+            <a:schemeClr val="lt1"/>
+          </a:fontRef>
+        </p:style>
+        <p:txBody>
+          <a:bodyPr lIns="0" tIns="0" rIns="0" bIns="0" rtlCol="0" anchor="ctr"/>
+          <a:lstStyle/>
+          <a:p>
+            <a:pPr algn="ctr"/>
+            <a:r>
+              <a:rPr lang="es-CO" dirty="0" smtClean="0"/>
+              <a:t>X</a:t>
+            </a:r>
+            <a:r>
+              <a:rPr lang="es-CO" baseline="-25000" dirty="0" smtClean="0"/>
+              <a:t>2</a:t>
+            </a:r>
+            <a:endParaRPr lang="es-MX" baseline="-25000" dirty="0"/>
+          </a:p>
+        </p:txBody>
+      </p:sp>
+      <p:sp>
+        <p:nvSpPr>
+          <p:cNvPr id="51" name="50 Elipse"/>
+          <p:cNvSpPr/>
+          <p:nvPr/>
+        </p:nvSpPr>
+        <p:spPr>
+          <a:xfrm>
+            <a:off x="3335276" y="4558888"/>
+            <a:ext cx="504056" cy="504056"/>
+          </a:xfrm>
+          <a:prstGeom prst="ellipse">
+            <a:avLst/>
+          </a:prstGeom>
+        </p:spPr>
+        <p:style>
+          <a:lnRef idx="2">
+            <a:schemeClr val="accent1">
+              <a:shade val="50000"/>
+            </a:schemeClr>
+          </a:lnRef>
+          <a:fillRef idx="1">
+            <a:schemeClr val="accent1"/>
+          </a:fillRef>
+          <a:effectRef idx="0">
+            <a:schemeClr val="accent1"/>
+          </a:effectRef>
+          <a:fontRef idx="minor">
+            <a:schemeClr val="lt1"/>
+          </a:fontRef>
+        </p:style>
+        <p:txBody>
+          <a:bodyPr lIns="0" tIns="0" rIns="0" bIns="0" rtlCol="0" anchor="ctr"/>
+          <a:lstStyle/>
+          <a:p>
+            <a:pPr algn="ctr"/>
+            <a:r>
+              <a:rPr lang="es-CO" dirty="0" smtClean="0"/>
+              <a:t>X</a:t>
+            </a:r>
+            <a:r>
+              <a:rPr lang="es-CO" baseline="-25000" dirty="0" smtClean="0"/>
+              <a:t>3</a:t>
+            </a:r>
+            <a:endParaRPr lang="es-MX" baseline="-25000" dirty="0"/>
+          </a:p>
+        </p:txBody>
+      </p:sp>
+      <p:sp>
+        <p:nvSpPr>
+          <p:cNvPr id="65" name="64 Elipse"/>
+          <p:cNvSpPr/>
+          <p:nvPr/>
+        </p:nvSpPr>
+        <p:spPr>
+          <a:xfrm>
+            <a:off x="4415396" y="4558888"/>
+            <a:ext cx="504056" cy="504056"/>
+          </a:xfrm>
+          <a:prstGeom prst="ellipse">
+            <a:avLst/>
+          </a:prstGeom>
+        </p:spPr>
+        <p:style>
+          <a:lnRef idx="2">
+            <a:schemeClr val="accent1">
+              <a:shade val="50000"/>
+            </a:schemeClr>
+          </a:lnRef>
+          <a:fillRef idx="1">
+            <a:schemeClr val="accent1"/>
+          </a:fillRef>
+          <a:effectRef idx="0">
+            <a:schemeClr val="accent1"/>
+          </a:effectRef>
+          <a:fontRef idx="minor">
+            <a:schemeClr val="lt1"/>
+          </a:fontRef>
+        </p:style>
+        <p:txBody>
+          <a:bodyPr lIns="0" tIns="0" rIns="0" bIns="0" rtlCol="0" anchor="ctr"/>
+          <a:lstStyle/>
+          <a:p>
+            <a:pPr algn="ctr"/>
+            <a:r>
+              <a:rPr lang="es-CO" dirty="0" err="1" smtClean="0"/>
+              <a:t>X</a:t>
+            </a:r>
+            <a:r>
+              <a:rPr lang="es-CO" baseline="-25000" dirty="0" err="1" smtClean="0"/>
+              <a:t>n</a:t>
+            </a:r>
+            <a:endParaRPr lang="es-MX" baseline="-25000" dirty="0"/>
+          </a:p>
+        </p:txBody>
+      </p:sp>
+      <p:sp>
+        <p:nvSpPr>
+          <p:cNvPr id="66" name="TextBox 11"/>
+          <p:cNvSpPr txBox="1"/>
+          <p:nvPr/>
+        </p:nvSpPr>
+        <p:spPr>
+          <a:xfrm>
+            <a:off x="3920181" y="4533488"/>
+            <a:ext cx="434171" cy="461665"/>
+          </a:xfrm>
+          <a:prstGeom prst="rect">
+            <a:avLst/>
+          </a:prstGeom>
+          <a:noFill/>
+        </p:spPr>
+        <p:txBody>
+          <a:bodyPr vert="horz" wrap="square" rtlCol="0">
+            <a:spAutoFit/>
+          </a:bodyPr>
+          <a:lstStyle/>
+          <a:p>
+            <a:pPr algn="ctr"/>
+            <a:r>
+              <a:rPr lang="en-US" sz="2400" b="1" dirty="0" smtClean="0">
+                <a:effectLst>
+                  <a:glow rad="76200">
+                    <a:schemeClr val="bg1">
+                      <a:alpha val="70000"/>
+                    </a:schemeClr>
+                  </a:glow>
+                </a:effectLst>
+                <a:ea typeface="Verdana" panose="020B0604030504040204" pitchFamily="34" charset="0"/>
+                <a:cs typeface="Verdana" panose="020B0604030504040204" pitchFamily="34" charset="0"/>
+              </a:rPr>
+              <a:t>…</a:t>
+            </a:r>
+            <a:endParaRPr lang="en-US" sz="2400" b="1" dirty="0">
+              <a:effectLst>
+                <a:glow rad="76200">
+                  <a:schemeClr val="bg1">
+                    <a:alpha val="70000"/>
+                  </a:schemeClr>
+                </a:glow>
+              </a:effectLst>
+              <a:ea typeface="Verdana" panose="020B0604030504040204" pitchFamily="34" charset="0"/>
+              <a:cs typeface="Verdana" panose="020B0604030504040204" pitchFamily="34" charset="0"/>
+            </a:endParaRPr>
+          </a:p>
+        </p:txBody>
+      </p:sp>
+      <p:cxnSp>
+        <p:nvCxnSpPr>
+          <p:cNvPr id="67" name="66 Conector recto de flecha"/>
+          <p:cNvCxnSpPr>
+            <a:endCxn id="49" idx="0"/>
+          </p:cNvCxnSpPr>
+          <p:nvPr/>
+        </p:nvCxnSpPr>
+        <p:spPr>
+          <a:xfrm>
+            <a:off x="2147144" y="4080232"/>
+            <a:ext cx="0" cy="478656"/>
+          </a:xfrm>
+          <a:prstGeom prst="straightConnector1">
+            <a:avLst/>
+          </a:prstGeom>
+          <a:ln w="38100">
+            <a:solidFill>
+              <a:schemeClr val="accent6">
+                <a:lumMod val="75000"/>
+              </a:schemeClr>
+            </a:solidFill>
+            <a:tailEnd type="arrow"/>
+          </a:ln>
+        </p:spPr>
+        <p:style>
+          <a:lnRef idx="1">
+            <a:schemeClr val="accent1"/>
+          </a:lnRef>
+          <a:fillRef idx="0">
+            <a:schemeClr val="accent1"/>
+          </a:fillRef>
+          <a:effectRef idx="0">
+            <a:schemeClr val="accent1"/>
+          </a:effectRef>
+          <a:fontRef idx="minor">
+            <a:schemeClr val="tx1"/>
+          </a:fontRef>
+        </p:style>
+      </p:cxnSp>
+      <p:cxnSp>
+        <p:nvCxnSpPr>
+          <p:cNvPr id="68" name="67 Conector recto de flecha"/>
+          <p:cNvCxnSpPr>
+            <a:endCxn id="50" idx="0"/>
+          </p:cNvCxnSpPr>
+          <p:nvPr/>
+        </p:nvCxnSpPr>
+        <p:spPr>
+          <a:xfrm>
+            <a:off x="2867224" y="4080232"/>
+            <a:ext cx="0" cy="478656"/>
+          </a:xfrm>
+          <a:prstGeom prst="straightConnector1">
+            <a:avLst/>
+          </a:prstGeom>
+          <a:ln w="38100">
+            <a:solidFill>
+              <a:schemeClr val="accent6">
+                <a:lumMod val="75000"/>
+              </a:schemeClr>
+            </a:solidFill>
+            <a:tailEnd type="arrow"/>
+          </a:ln>
+        </p:spPr>
+        <p:style>
+          <a:lnRef idx="1">
+            <a:schemeClr val="accent1"/>
+          </a:lnRef>
+          <a:fillRef idx="0">
+            <a:schemeClr val="accent1"/>
+          </a:fillRef>
+          <a:effectRef idx="0">
+            <a:schemeClr val="accent1"/>
+          </a:effectRef>
+          <a:fontRef idx="minor">
+            <a:schemeClr val="tx1"/>
+          </a:fontRef>
+        </p:style>
+      </p:cxnSp>
+      <p:cxnSp>
+        <p:nvCxnSpPr>
+          <p:cNvPr id="69" name="68 Conector recto de flecha"/>
+          <p:cNvCxnSpPr>
+            <a:endCxn id="51" idx="0"/>
+          </p:cNvCxnSpPr>
+          <p:nvPr/>
+        </p:nvCxnSpPr>
+        <p:spPr>
+          <a:xfrm>
+            <a:off x="3587304" y="4080232"/>
+            <a:ext cx="0" cy="478656"/>
+          </a:xfrm>
+          <a:prstGeom prst="straightConnector1">
+            <a:avLst/>
+          </a:prstGeom>
+          <a:ln w="38100">
+            <a:solidFill>
+              <a:schemeClr val="accent6">
+                <a:lumMod val="75000"/>
+              </a:schemeClr>
+            </a:solidFill>
+            <a:tailEnd type="arrow"/>
+          </a:ln>
+        </p:spPr>
+        <p:style>
+          <a:lnRef idx="1">
+            <a:schemeClr val="accent1"/>
+          </a:lnRef>
+          <a:fillRef idx="0">
+            <a:schemeClr val="accent1"/>
+          </a:fillRef>
+          <a:effectRef idx="0">
+            <a:schemeClr val="accent1"/>
+          </a:effectRef>
+          <a:fontRef idx="minor">
+            <a:schemeClr val="tx1"/>
+          </a:fontRef>
+        </p:style>
+      </p:cxnSp>
+      <p:cxnSp>
+        <p:nvCxnSpPr>
+          <p:cNvPr id="70" name="69 Conector recto de flecha"/>
+          <p:cNvCxnSpPr>
+            <a:endCxn id="65" idx="0"/>
+          </p:cNvCxnSpPr>
+          <p:nvPr/>
+        </p:nvCxnSpPr>
+        <p:spPr>
+          <a:xfrm>
+            <a:off x="4667424" y="4080232"/>
+            <a:ext cx="0" cy="478656"/>
+          </a:xfrm>
+          <a:prstGeom prst="straightConnector1">
+            <a:avLst/>
+          </a:prstGeom>
+          <a:ln w="38100">
+            <a:solidFill>
+              <a:schemeClr val="accent6">
+                <a:lumMod val="75000"/>
+              </a:schemeClr>
+            </a:solidFill>
+            <a:tailEnd type="arrow"/>
+          </a:ln>
+        </p:spPr>
+        <p:style>
+          <a:lnRef idx="1">
+            <a:schemeClr val="accent1"/>
+          </a:lnRef>
+          <a:fillRef idx="0">
+            <a:schemeClr val="accent1"/>
+          </a:fillRef>
+          <a:effectRef idx="0">
+            <a:schemeClr val="accent1"/>
+          </a:effectRef>
+          <a:fontRef idx="minor">
+            <a:schemeClr val="tx1"/>
+          </a:fontRef>
+        </p:style>
+      </p:cxnSp>
+      <p:sp>
+        <p:nvSpPr>
+          <p:cNvPr id="52" name="51 Elipse"/>
+          <p:cNvSpPr/>
+          <p:nvPr/>
+        </p:nvSpPr>
+        <p:spPr>
+          <a:xfrm>
+            <a:off x="1895116" y="3598416"/>
+            <a:ext cx="504056" cy="504056"/>
+          </a:xfrm>
+          <a:prstGeom prst="ellipse">
+            <a:avLst/>
+          </a:prstGeom>
+          <a:solidFill>
+            <a:schemeClr val="accent6"/>
+          </a:solidFill>
+          <a:ln>
+            <a:solidFill>
+              <a:schemeClr val="accent6">
+                <a:lumMod val="50000"/>
+              </a:schemeClr>
+            </a:solidFill>
+          </a:ln>
+        </p:spPr>
+        <p:style>
+          <a:lnRef idx="2">
+            <a:schemeClr val="accent1">
+              <a:shade val="50000"/>
+            </a:schemeClr>
+          </a:lnRef>
+          <a:fillRef idx="1">
+            <a:schemeClr val="accent1"/>
+          </a:fillRef>
+          <a:effectRef idx="0">
+            <a:schemeClr val="accent1"/>
+          </a:effectRef>
+          <a:fontRef idx="minor">
+            <a:schemeClr val="lt1"/>
+          </a:fontRef>
+        </p:style>
+        <p:txBody>
+          <a:bodyPr lIns="0" tIns="0" rIns="0" bIns="0" rtlCol="0" anchor="ctr"/>
+          <a:lstStyle/>
+          <a:p>
+            <a:pPr algn="ctr"/>
+            <a:r>
+              <a:rPr lang="es-CO" i="1" dirty="0" smtClean="0"/>
+              <a:t>X</a:t>
+            </a:r>
+            <a:r>
+              <a:rPr lang="es-CO" baseline="-25000" dirty="0" smtClean="0"/>
+              <a:t>1</a:t>
+            </a:r>
+            <a:endParaRPr lang="es-MX" baseline="-25000" dirty="0"/>
+          </a:p>
+        </p:txBody>
+      </p:sp>
+      <p:sp>
+        <p:nvSpPr>
+          <p:cNvPr id="54" name="53 Elipse"/>
+          <p:cNvSpPr/>
+          <p:nvPr/>
+        </p:nvSpPr>
+        <p:spPr>
+          <a:xfrm>
+            <a:off x="3335276" y="3598416"/>
+            <a:ext cx="504056" cy="504056"/>
+          </a:xfrm>
+          <a:prstGeom prst="ellipse">
+            <a:avLst/>
+          </a:prstGeom>
+          <a:solidFill>
+            <a:schemeClr val="accent6"/>
+          </a:solidFill>
+          <a:ln>
+            <a:solidFill>
+              <a:schemeClr val="accent6">
+                <a:lumMod val="50000"/>
+              </a:schemeClr>
+            </a:solidFill>
+          </a:ln>
+        </p:spPr>
+        <p:style>
+          <a:lnRef idx="2">
+            <a:schemeClr val="accent1">
+              <a:shade val="50000"/>
+            </a:schemeClr>
+          </a:lnRef>
+          <a:fillRef idx="1">
+            <a:schemeClr val="accent1"/>
+          </a:fillRef>
+          <a:effectRef idx="0">
+            <a:schemeClr val="accent1"/>
+          </a:effectRef>
+          <a:fontRef idx="minor">
+            <a:schemeClr val="lt1"/>
+          </a:fontRef>
+        </p:style>
+        <p:txBody>
+          <a:bodyPr lIns="0" tIns="0" rIns="0" bIns="0" rtlCol="0" anchor="ctr"/>
+          <a:lstStyle/>
+          <a:p>
+            <a:pPr algn="ctr"/>
+            <a:r>
+              <a:rPr lang="es-CO" i="1" dirty="0" smtClean="0"/>
+              <a:t>X</a:t>
+            </a:r>
+            <a:r>
+              <a:rPr lang="es-CO" baseline="-25000" dirty="0" smtClean="0"/>
+              <a:t>3</a:t>
+            </a:r>
+            <a:endParaRPr lang="es-MX" baseline="-25000" dirty="0"/>
+          </a:p>
+        </p:txBody>
+      </p:sp>
+      <p:sp>
+        <p:nvSpPr>
+          <p:cNvPr id="55" name="54 Elipse"/>
+          <p:cNvSpPr/>
+          <p:nvPr/>
+        </p:nvSpPr>
+        <p:spPr>
+          <a:xfrm>
+            <a:off x="4415396" y="3598416"/>
+            <a:ext cx="504056" cy="504056"/>
+          </a:xfrm>
+          <a:prstGeom prst="ellipse">
+            <a:avLst/>
+          </a:prstGeom>
+          <a:solidFill>
+            <a:schemeClr val="accent6"/>
+          </a:solidFill>
+          <a:ln>
+            <a:solidFill>
+              <a:schemeClr val="accent6">
+                <a:lumMod val="50000"/>
+              </a:schemeClr>
+            </a:solidFill>
+          </a:ln>
+        </p:spPr>
+        <p:style>
+          <a:lnRef idx="2">
+            <a:schemeClr val="accent1">
+              <a:shade val="50000"/>
+            </a:schemeClr>
+          </a:lnRef>
+          <a:fillRef idx="1">
+            <a:schemeClr val="accent1"/>
+          </a:fillRef>
+          <a:effectRef idx="0">
+            <a:schemeClr val="accent1"/>
+          </a:effectRef>
+          <a:fontRef idx="minor">
+            <a:schemeClr val="lt1"/>
+          </a:fontRef>
+        </p:style>
+        <p:txBody>
+          <a:bodyPr lIns="0" tIns="0" rIns="0" bIns="0" rtlCol="0" anchor="ctr"/>
+          <a:lstStyle/>
+          <a:p>
+            <a:pPr algn="ctr"/>
+            <a:r>
+              <a:rPr lang="es-CO" i="1" dirty="0" err="1" smtClean="0"/>
+              <a:t>X</a:t>
+            </a:r>
+            <a:r>
+              <a:rPr lang="es-CO" baseline="-25000" dirty="0" err="1" smtClean="0"/>
+              <a:t>n</a:t>
+            </a:r>
+            <a:endParaRPr lang="es-MX" baseline="-25000" dirty="0"/>
+          </a:p>
+        </p:txBody>
+      </p:sp>
+      <p:sp>
+        <p:nvSpPr>
+          <p:cNvPr id="53" name="52 Elipse"/>
+          <p:cNvSpPr/>
+          <p:nvPr/>
+        </p:nvSpPr>
+        <p:spPr>
+          <a:xfrm>
+            <a:off x="2615196" y="3598416"/>
+            <a:ext cx="504056" cy="504056"/>
+          </a:xfrm>
+          <a:prstGeom prst="ellipse">
+            <a:avLst/>
+          </a:prstGeom>
+          <a:solidFill>
+            <a:schemeClr val="accent6"/>
+          </a:solidFill>
+          <a:ln>
+            <a:solidFill>
+              <a:schemeClr val="accent6">
+                <a:lumMod val="50000"/>
+              </a:schemeClr>
+            </a:solidFill>
+          </a:ln>
+        </p:spPr>
+        <p:style>
+          <a:lnRef idx="2">
+            <a:schemeClr val="accent1">
+              <a:shade val="50000"/>
+            </a:schemeClr>
+          </a:lnRef>
+          <a:fillRef idx="1">
+            <a:schemeClr val="accent1"/>
+          </a:fillRef>
+          <a:effectRef idx="0">
+            <a:schemeClr val="accent1"/>
+          </a:effectRef>
+          <a:fontRef idx="minor">
+            <a:schemeClr val="lt1"/>
+          </a:fontRef>
+        </p:style>
+        <p:txBody>
+          <a:bodyPr lIns="0" tIns="0" rIns="0" bIns="0" rtlCol="0" anchor="ctr"/>
+          <a:lstStyle/>
+          <a:p>
+            <a:pPr algn="ctr"/>
+            <a:r>
+              <a:rPr lang="es-CO" i="1" dirty="0" smtClean="0"/>
+              <a:t>X</a:t>
+            </a:r>
+            <a:r>
+              <a:rPr lang="es-CO" baseline="-25000" dirty="0" smtClean="0"/>
+              <a:t>2</a:t>
+            </a:r>
+            <a:endParaRPr lang="es-MX" baseline="-25000" dirty="0"/>
+          </a:p>
+        </p:txBody>
+      </p:sp>
+    </p:spTree>
+    <p:extLst>
+      <p:ext uri="{BB962C8B-B14F-4D97-AF65-F5344CB8AC3E}">
+        <p14:creationId xmlns:p14="http://schemas.microsoft.com/office/powerpoint/2010/main" val="2144458794"/>
       </p:ext>
     </p:extLst>
   </p:cSld>

</xml_diff>